<commit_message>
updated readme after eksctl update
</commit_message>
<xml_diff>
--- a/architecture/HyperledgerOnKubernetesArchitecture.pptx
+++ b/architecture/HyperledgerOnKubernetesArchitecture.pptx
@@ -349,7 +349,7 @@
             <a:fld id="{0B25AC41-3BEC-9247-8322-91B80C013F2D}" type="datetimeFigureOut">
               <a:rPr lang="en-US" smtClean="0"/>
               <a:pPr/>
-              <a:t>8/30/18</a:t>
+              <a:t>9/15/18</a:t>
             </a:fld>
             <a:endParaRPr lang="en-US" dirty="0"/>
           </a:p>
@@ -14818,7 +14818,7 @@
         </p:nvGrpSpPr>
         <p:grpSpPr>
           <a:xfrm>
-            <a:off x="2713667" y="2908651"/>
+            <a:off x="2713667" y="2718651"/>
             <a:ext cx="3232324" cy="984395"/>
             <a:chOff x="6743700" y="760413"/>
             <a:chExt cx="1752600" cy="1733550"/>
@@ -15088,7 +15088,7 @@
         </p:nvSpPr>
         <p:spPr>
           <a:xfrm>
-            <a:off x="2448910" y="1268436"/>
+            <a:off x="2448910" y="1078436"/>
             <a:ext cx="3699436" cy="3217670"/>
           </a:xfrm>
           <a:prstGeom prst="roundRect">
@@ -15164,7 +15164,7 @@
         </p:blipFill>
         <p:spPr>
           <a:xfrm>
-            <a:off x="2802296" y="961668"/>
+            <a:off x="2802296" y="771668"/>
             <a:ext cx="449378" cy="449378"/>
           </a:xfrm>
           <a:prstGeom prst="rect">
@@ -15186,7 +15186,7 @@
         </p:nvGrpSpPr>
         <p:grpSpPr>
           <a:xfrm>
-            <a:off x="2526440" y="1351666"/>
+            <a:off x="2526440" y="1161666"/>
             <a:ext cx="1596890" cy="3095517"/>
             <a:chOff x="2549525" y="760413"/>
             <a:chExt cx="1689100" cy="1738034"/>
@@ -15320,7 +15320,7 @@
         </p:nvSpPr>
         <p:spPr>
           <a:xfrm>
-            <a:off x="2571700" y="2563392"/>
+            <a:off x="2571700" y="2373392"/>
             <a:ext cx="1488768" cy="1704512"/>
           </a:xfrm>
           <a:prstGeom prst="roundRect">
@@ -15384,7 +15384,7 @@
         </p:nvSpPr>
         <p:spPr bwMode="auto">
           <a:xfrm>
-            <a:off x="2736776" y="4091689"/>
+            <a:off x="2736776" y="3901689"/>
             <a:ext cx="1181898" cy="196208"/>
           </a:xfrm>
           <a:prstGeom prst="rect">
@@ -15430,7 +15430,7 @@
         </p:nvSpPr>
         <p:spPr bwMode="auto">
           <a:xfrm>
-            <a:off x="2802297" y="2988220"/>
+            <a:off x="2802297" y="2798220"/>
             <a:ext cx="3081846" cy="790526"/>
           </a:xfrm>
           <a:prstGeom prst="roundRect">
@@ -15500,7 +15500,7 @@
         </p:blipFill>
         <p:spPr>
           <a:xfrm>
-            <a:off x="2854066" y="2444331"/>
+            <a:off x="2854066" y="2254331"/>
             <a:ext cx="161925" cy="180975"/>
           </a:xfrm>
           <a:prstGeom prst="rect">
@@ -15522,7 +15522,7 @@
         </p:nvGrpSpPr>
         <p:grpSpPr>
           <a:xfrm>
-            <a:off x="2580288" y="1587052"/>
+            <a:off x="2580288" y="1397052"/>
             <a:ext cx="1453961" cy="869232"/>
             <a:chOff x="4614166" y="2802748"/>
             <a:chExt cx="1752600" cy="1858455"/>
@@ -15653,7 +15653,7 @@
         </p:nvSpPr>
         <p:spPr>
           <a:xfrm>
-            <a:off x="4014318" y="2054380"/>
+            <a:off x="4014318" y="1864380"/>
             <a:ext cx="578100" cy="180650"/>
           </a:xfrm>
           <a:prstGeom prst="rect">
@@ -15703,7 +15703,7 @@
         </p:blipFill>
         <p:spPr>
           <a:xfrm>
-            <a:off x="4160855" y="1764840"/>
+            <a:off x="4160855" y="1574840"/>
             <a:ext cx="259811" cy="270000"/>
           </a:xfrm>
           <a:prstGeom prst="rect">
@@ -15733,7 +15733,7 @@
         </p:blipFill>
         <p:spPr>
           <a:xfrm>
-            <a:off x="2854067" y="1461748"/>
+            <a:off x="2854067" y="1271748"/>
             <a:ext cx="161925" cy="180975"/>
           </a:xfrm>
           <a:prstGeom prst="rect">
@@ -15770,7 +15770,7 @@
         </p:blipFill>
         <p:spPr bwMode="auto">
           <a:xfrm>
-            <a:off x="5373104" y="2586747"/>
+            <a:off x="5373104" y="2396747"/>
             <a:ext cx="448991" cy="368173"/>
           </a:xfrm>
           <a:prstGeom prst="rect">
@@ -15802,7 +15802,7 @@
         </p:nvGrpSpPr>
         <p:grpSpPr>
           <a:xfrm>
-            <a:off x="3114285" y="3020155"/>
+            <a:off x="3114285" y="2830155"/>
             <a:ext cx="981196" cy="799781"/>
             <a:chOff x="1724620" y="3715170"/>
             <a:chExt cx="1308261" cy="1066375"/>
@@ -16161,7 +16161,7 @@
         </p:nvGrpSpPr>
         <p:grpSpPr>
           <a:xfrm>
-            <a:off x="4511402" y="3020155"/>
+            <a:off x="4511402" y="2830155"/>
             <a:ext cx="981196" cy="799781"/>
             <a:chOff x="1724620" y="3715170"/>
             <a:chExt cx="1308261" cy="1066375"/>
@@ -16520,7 +16520,7 @@
         </p:nvGrpSpPr>
         <p:grpSpPr>
           <a:xfrm>
-            <a:off x="2713667" y="1712033"/>
+            <a:off x="2713667" y="1522033"/>
             <a:ext cx="3232325" cy="564760"/>
             <a:chOff x="6743700" y="760413"/>
             <a:chExt cx="1752600" cy="1733550"/>
@@ -16740,7 +16740,7 @@
         </p:nvSpPr>
         <p:spPr>
           <a:xfrm>
-            <a:off x="3763287" y="4774168"/>
+            <a:off x="3763287" y="4584168"/>
             <a:ext cx="2647423" cy="369332"/>
           </a:xfrm>
           <a:prstGeom prst="rect">
@@ -16772,7 +16772,7 @@
         </p:nvSpPr>
         <p:spPr>
           <a:xfrm>
-            <a:off x="3205688" y="4504963"/>
+            <a:off x="3205688" y="4314963"/>
             <a:ext cx="2689842" cy="369332"/>
           </a:xfrm>
           <a:prstGeom prst="rect">
@@ -16821,7 +16821,7 @@
         </p:nvCxnSpPr>
         <p:spPr>
           <a:xfrm rot="10800000" flipV="1">
-            <a:off x="3601681" y="1899840"/>
+            <a:off x="3601681" y="1709840"/>
             <a:ext cx="559175" cy="1145120"/>
           </a:xfrm>
           <a:prstGeom prst="bentConnector2">
@@ -16869,7 +16869,7 @@
         </p:nvCxnSpPr>
         <p:spPr>
           <a:xfrm>
-            <a:off x="4420666" y="1899840"/>
+            <a:off x="4420666" y="1709840"/>
             <a:ext cx="578131" cy="1145120"/>
           </a:xfrm>
           <a:prstGeom prst="bentConnector2">
@@ -16927,7 +16927,7 @@
         </p:blipFill>
         <p:spPr>
           <a:xfrm>
-            <a:off x="5274753" y="1742274"/>
+            <a:off x="5274753" y="1552274"/>
             <a:ext cx="312868" cy="375441"/>
           </a:xfrm>
           <a:prstGeom prst="rect">
@@ -16949,7 +16949,7 @@
         </p:nvSpPr>
         <p:spPr>
           <a:xfrm>
-            <a:off x="5109297" y="2126269"/>
+            <a:off x="5109297" y="1936269"/>
             <a:ext cx="643781" cy="155632"/>
           </a:xfrm>
           <a:prstGeom prst="rect">
@@ -16999,7 +16999,7 @@
         </p:blipFill>
         <p:spPr>
           <a:xfrm>
-            <a:off x="6566052" y="3219905"/>
+            <a:off x="6566052" y="3029905"/>
             <a:ext cx="321818" cy="386181"/>
           </a:xfrm>
           <a:prstGeom prst="rect">
@@ -17021,7 +17021,7 @@
         </p:nvSpPr>
         <p:spPr>
           <a:xfrm>
-            <a:off x="6909996" y="3381051"/>
+            <a:off x="6909996" y="3191051"/>
             <a:ext cx="512483" cy="92188"/>
           </a:xfrm>
           <a:prstGeom prst="rect">
@@ -17053,15 +17053,16 @@
             </a:extLst>
           </p:cNvPr>
           <p:cNvCxnSpPr>
+            <a:cxnSpLocks/>
             <a:stCxn id="144" idx="0"/>
-            <a:endCxn id="122" idx="3"/>
+            <a:endCxn id="150" idx="3"/>
           </p:cNvCxnSpPr>
           <p:nvPr/>
         </p:nvCxnSpPr>
         <p:spPr>
           <a:xfrm rot="16200000" flipV="1">
-            <a:off x="5512336" y="2005280"/>
-            <a:ext cx="1289910" cy="1139340"/>
+            <a:off x="5749630" y="2052574"/>
+            <a:ext cx="1227447" cy="727216"/>
           </a:xfrm>
           <a:prstGeom prst="bentConnector2">
             <a:avLst/>
@@ -17109,7 +17110,7 @@
         </p:nvCxnSpPr>
         <p:spPr>
           <a:xfrm rot="10800000" flipV="1">
-            <a:off x="6020728" y="3412995"/>
+            <a:off x="6020728" y="3222995"/>
             <a:ext cx="545325" cy="7209"/>
           </a:xfrm>
           <a:prstGeom prst="bentConnector3">
@@ -17156,7 +17157,7 @@
         </p:nvSpPr>
         <p:spPr>
           <a:xfrm>
-            <a:off x="4531959" y="2567949"/>
+            <a:off x="4531959" y="2377949"/>
             <a:ext cx="1488768" cy="1704512"/>
           </a:xfrm>
           <a:prstGeom prst="roundRect">
@@ -17220,7 +17221,7 @@
         </p:nvSpPr>
         <p:spPr bwMode="auto">
           <a:xfrm>
-            <a:off x="4697035" y="4096246"/>
+            <a:off x="4697035" y="3906246"/>
             <a:ext cx="1181898" cy="196208"/>
           </a:xfrm>
           <a:prstGeom prst="rect">
@@ -17266,7 +17267,7 @@
         </p:nvGrpSpPr>
         <p:grpSpPr>
           <a:xfrm>
-            <a:off x="4545784" y="1587052"/>
+            <a:off x="4545784" y="1397052"/>
             <a:ext cx="1453961" cy="859216"/>
             <a:chOff x="4629150" y="2824163"/>
             <a:chExt cx="1752600" cy="1837040"/>
@@ -17397,7 +17398,7 @@
         </p:nvGrpSpPr>
         <p:grpSpPr>
           <a:xfrm>
-            <a:off x="4461357" y="1347672"/>
+            <a:off x="4461357" y="1157672"/>
             <a:ext cx="1622816" cy="3095517"/>
             <a:chOff x="2549525" y="760413"/>
             <a:chExt cx="1689100" cy="1738034"/>
@@ -17539,7 +17540,7 @@
         </p:blipFill>
         <p:spPr>
           <a:xfrm>
-            <a:off x="4836872" y="1465472"/>
+            <a:off x="4836872" y="1275472"/>
             <a:ext cx="161925" cy="180975"/>
           </a:xfrm>
           <a:prstGeom prst="rect">
@@ -17569,7 +17570,7 @@
         </p:blipFill>
         <p:spPr>
           <a:xfrm>
-            <a:off x="4835805" y="2460452"/>
+            <a:off x="4835805" y="2270452"/>
             <a:ext cx="161925" cy="180975"/>
           </a:xfrm>
           <a:prstGeom prst="rect">
@@ -17594,7 +17595,7 @@
         </p:nvCxnSpPr>
         <p:spPr>
           <a:xfrm rot="5400000">
-            <a:off x="5177814" y="2465579"/>
+            <a:off x="5177814" y="2275579"/>
             <a:ext cx="408641" cy="2689654"/>
           </a:xfrm>
           <a:prstGeom prst="bentConnector2">
@@ -19727,6 +19728,21 @@
 </file>
 
 <file path=customXml/item1.xml><?xml version="1.0" encoding="utf-8"?>
+<?mso-contentType ?>
+<FormTemplates xmlns="http://schemas.microsoft.com/sharepoint/v3/contenttype/forms">
+  <Display>DocumentLibraryForm</Display>
+  <Edit>DocumentLibraryForm</Edit>
+  <New>DocumentLibraryForm</New>
+</FormTemplates>
+</file>
+
+<file path=customXml/item2.xml><?xml version="1.0" encoding="utf-8"?>
+<p:properties xmlns:p="http://schemas.microsoft.com/office/2006/metadata/properties" xmlns:xsi="http://www.w3.org/2001/XMLSchema-instance">
+  <documentManagement/>
+</p:properties>
+</file>
+
+<file path=customXml/item3.xml><?xml version="1.0" encoding="utf-8"?>
 <ct:contentTypeSchema xmlns:ct="http://schemas.microsoft.com/office/2006/metadata/contentType" xmlns:ma="http://schemas.microsoft.com/office/2006/metadata/properties/metaAttributes" ct:_="" ma:_="" ma:contentTypeName="Document" ma:contentTypeID="0x010100D26A3D6C04DFD740953BA1B2B9E62D60" ma:contentTypeVersion="0" ma:contentTypeDescription="Create a new document." ma:contentTypeScope="" ma:versionID="26617cd14cd3af163c0e97ff614e520a">
   <xsd:schema xmlns:xsd="http://www.w3.org/2001/XMLSchema" xmlns:xs="http://www.w3.org/2001/XMLSchema" xmlns:p="http://schemas.microsoft.com/office/2006/metadata/properties" targetNamespace="http://schemas.microsoft.com/office/2006/metadata/properties" ma:root="true" ma:fieldsID="c64490b4aec6201516c3a874156f37b2">
     <xsd:element name="properties">
@@ -19840,33 +19856,10 @@
 </ct:contentTypeSchema>
 </file>
 
-<file path=customXml/item2.xml><?xml version="1.0" encoding="utf-8"?>
-<p:properties xmlns:p="http://schemas.microsoft.com/office/2006/metadata/properties" xmlns:xsi="http://www.w3.org/2001/XMLSchema-instance">
-  <documentManagement/>
-</p:properties>
-</file>
-
-<file path=customXml/item3.xml><?xml version="1.0" encoding="utf-8"?>
-<?mso-contentType ?>
-<FormTemplates xmlns="http://schemas.microsoft.com/sharepoint/v3/contenttype/forms">
-  <Display>DocumentLibraryForm</Display>
-  <Edit>DocumentLibraryForm</Edit>
-  <New>DocumentLibraryForm</New>
-</FormTemplates>
-</file>
-
 <file path=customXml/itemProps1.xml><?xml version="1.0" encoding="utf-8"?>
-<ds:datastoreItem xmlns:ds="http://schemas.openxmlformats.org/officeDocument/2006/customXml" ds:itemID="{51A3258A-222C-4488-825E-7520D001FB75}">
+<ds:datastoreItem xmlns:ds="http://schemas.openxmlformats.org/officeDocument/2006/customXml" ds:itemID="{705B35A6-8B52-46A5-AE45-B98C6459DC10}">
   <ds:schemaRefs>
-    <ds:schemaRef ds:uri="http://schemas.microsoft.com/office/2006/metadata/contentType"/>
-    <ds:schemaRef ds:uri="http://schemas.microsoft.com/office/2006/metadata/properties/metaAttributes"/>
-    <ds:schemaRef ds:uri="http://www.w3.org/2001/XMLSchema"/>
-    <ds:schemaRef ds:uri="http://schemas.microsoft.com/office/2006/metadata/properties"/>
-    <ds:schemaRef ds:uri="http://schemas.openxmlformats.org/package/2006/metadata/core-properties"/>
-    <ds:schemaRef ds:uri="http://purl.org/dc/elements/1.1/"/>
-    <ds:schemaRef ds:uri="http://purl.org/dc/terms/"/>
-    <ds:schemaRef ds:uri="http://schemas.microsoft.com/internal/obd"/>
-    <ds:schemaRef ds:uri="http://schemas.microsoft.com/office/infopath/2007/PartnerControls"/>
+    <ds:schemaRef ds:uri="http://schemas.microsoft.com/sharepoint/v3/contenttype/forms"/>
   </ds:schemaRefs>
 </ds:datastoreItem>
 </file>
@@ -19887,9 +19880,17 @@
 </file>
 
 <file path=customXml/itemProps3.xml><?xml version="1.0" encoding="utf-8"?>
-<ds:datastoreItem xmlns:ds="http://schemas.openxmlformats.org/officeDocument/2006/customXml" ds:itemID="{705B35A6-8B52-46A5-AE45-B98C6459DC10}">
+<ds:datastoreItem xmlns:ds="http://schemas.openxmlformats.org/officeDocument/2006/customXml" ds:itemID="{51A3258A-222C-4488-825E-7520D001FB75}">
   <ds:schemaRefs>
-    <ds:schemaRef ds:uri="http://schemas.microsoft.com/sharepoint/v3/contenttype/forms"/>
+    <ds:schemaRef ds:uri="http://schemas.microsoft.com/office/2006/metadata/contentType"/>
+    <ds:schemaRef ds:uri="http://schemas.microsoft.com/office/2006/metadata/properties/metaAttributes"/>
+    <ds:schemaRef ds:uri="http://www.w3.org/2001/XMLSchema"/>
+    <ds:schemaRef ds:uri="http://schemas.microsoft.com/office/2006/metadata/properties"/>
+    <ds:schemaRef ds:uri="http://schemas.openxmlformats.org/package/2006/metadata/core-properties"/>
+    <ds:schemaRef ds:uri="http://purl.org/dc/elements/1.1/"/>
+    <ds:schemaRef ds:uri="http://purl.org/dc/terms/"/>
+    <ds:schemaRef ds:uri="http://schemas.microsoft.com/internal/obd"/>
+    <ds:schemaRef ds:uri="http://schemas.microsoft.com/office/infopath/2007/PartnerControls"/>
   </ds:schemaRefs>
 </ds:datastoreItem>
 </file>
</xml_diff>